<commit_message>
tp1 and presentation ups
</commit_message>
<xml_diff>
--- a/computer_security/security_presentation_slides_kense.pptx
+++ b/computer_security/security_presentation_slides_kense.pptx
@@ -108,6 +108,11 @@
       </a:defRPr>
     </a:lvl9pPr>
   </p:defaultTextStyle>
+  <p:extLst>
+    <p:ext uri="{EFAFB233-063F-42B5-8137-9DF3F51BA10A}">
+      <p15:sldGuideLst xmlns:p15="http://schemas.microsoft.com/office/powerpoint/2012/main"/>
+    </p:ext>
+  </p:extLst>
 </p:presentation>
 </file>
 
@@ -258,7 +263,7 @@
           <a:p>
             <a:fld id="{A41E9547-312A-4FBD-96ED-561A28D80F98}" type="datetimeFigureOut">
               <a:rPr lang="en-US" smtClean="0"/>
-              <a:t>13-Oct-19</a:t>
+              <a:t>16-Oct-19</a:t>
             </a:fld>
             <a:endParaRPr lang="en-US"/>
           </a:p>
@@ -456,7 +461,7 @@
           <a:p>
             <a:fld id="{A41E9547-312A-4FBD-96ED-561A28D80F98}" type="datetimeFigureOut">
               <a:rPr lang="en-US" smtClean="0"/>
-              <a:t>13-Oct-19</a:t>
+              <a:t>16-Oct-19</a:t>
             </a:fld>
             <a:endParaRPr lang="en-US"/>
           </a:p>
@@ -664,7 +669,7 @@
           <a:p>
             <a:fld id="{A41E9547-312A-4FBD-96ED-561A28D80F98}" type="datetimeFigureOut">
               <a:rPr lang="en-US" smtClean="0"/>
-              <a:t>13-Oct-19</a:t>
+              <a:t>16-Oct-19</a:t>
             </a:fld>
             <a:endParaRPr lang="en-US"/>
           </a:p>
@@ -862,7 +867,7 @@
           <a:p>
             <a:fld id="{A41E9547-312A-4FBD-96ED-561A28D80F98}" type="datetimeFigureOut">
               <a:rPr lang="en-US" smtClean="0"/>
-              <a:t>13-Oct-19</a:t>
+              <a:t>16-Oct-19</a:t>
             </a:fld>
             <a:endParaRPr lang="en-US"/>
           </a:p>
@@ -1137,7 +1142,7 @@
           <a:p>
             <a:fld id="{A41E9547-312A-4FBD-96ED-561A28D80F98}" type="datetimeFigureOut">
               <a:rPr lang="en-US" smtClean="0"/>
-              <a:t>13-Oct-19</a:t>
+              <a:t>16-Oct-19</a:t>
             </a:fld>
             <a:endParaRPr lang="en-US"/>
           </a:p>
@@ -1402,7 +1407,7 @@
           <a:p>
             <a:fld id="{A41E9547-312A-4FBD-96ED-561A28D80F98}" type="datetimeFigureOut">
               <a:rPr lang="en-US" smtClean="0"/>
-              <a:t>13-Oct-19</a:t>
+              <a:t>16-Oct-19</a:t>
             </a:fld>
             <a:endParaRPr lang="en-US"/>
           </a:p>
@@ -1814,7 +1819,7 @@
           <a:p>
             <a:fld id="{A41E9547-312A-4FBD-96ED-561A28D80F98}" type="datetimeFigureOut">
               <a:rPr lang="en-US" smtClean="0"/>
-              <a:t>13-Oct-19</a:t>
+              <a:t>16-Oct-19</a:t>
             </a:fld>
             <a:endParaRPr lang="en-US"/>
           </a:p>
@@ -1955,7 +1960,7 @@
           <a:p>
             <a:fld id="{A41E9547-312A-4FBD-96ED-561A28D80F98}" type="datetimeFigureOut">
               <a:rPr lang="en-US" smtClean="0"/>
-              <a:t>13-Oct-19</a:t>
+              <a:t>16-Oct-19</a:t>
             </a:fld>
             <a:endParaRPr lang="en-US"/>
           </a:p>
@@ -2068,7 +2073,7 @@
           <a:p>
             <a:fld id="{A41E9547-312A-4FBD-96ED-561A28D80F98}" type="datetimeFigureOut">
               <a:rPr lang="en-US" smtClean="0"/>
-              <a:t>13-Oct-19</a:t>
+              <a:t>16-Oct-19</a:t>
             </a:fld>
             <a:endParaRPr lang="en-US"/>
           </a:p>
@@ -2379,7 +2384,7 @@
           <a:p>
             <a:fld id="{A41E9547-312A-4FBD-96ED-561A28D80F98}" type="datetimeFigureOut">
               <a:rPr lang="en-US" smtClean="0"/>
-              <a:t>13-Oct-19</a:t>
+              <a:t>16-Oct-19</a:t>
             </a:fld>
             <a:endParaRPr lang="en-US"/>
           </a:p>
@@ -2667,7 +2672,7 @@
           <a:p>
             <a:fld id="{A41E9547-312A-4FBD-96ED-561A28D80F98}" type="datetimeFigureOut">
               <a:rPr lang="en-US" smtClean="0"/>
-              <a:t>13-Oct-19</a:t>
+              <a:t>16-Oct-19</a:t>
             </a:fld>
             <a:endParaRPr lang="en-US"/>
           </a:p>
@@ -2908,7 +2913,7 @@
           <a:p>
             <a:fld id="{A41E9547-312A-4FBD-96ED-561A28D80F98}" type="datetimeFigureOut">
               <a:rPr lang="en-US" smtClean="0"/>
-              <a:t>13-Oct-19</a:t>
+              <a:t>16-Oct-19</a:t>
             </a:fld>
             <a:endParaRPr lang="en-US"/>
           </a:p>
@@ -3873,7 +3878,9 @@
         </p:nvSpPr>
         <p:spPr/>
         <p:txBody>
-          <a:bodyPr/>
+          <a:bodyPr>
+            <a:normAutofit/>
+          </a:bodyPr>
           <a:lstStyle/>
           <a:p>
             <a:r>
@@ -3893,13 +3900,19 @@
           <a:p>
             <a:r>
               <a:rPr lang="en-US" dirty="0"/>
-              <a:t>Checking for old passwords</a:t>
+              <a:t>What is “random?” How random is it? (True vs Pseudo) Do we know?</a:t>
             </a:r>
           </a:p>
           <a:p>
             <a:r>
               <a:rPr lang="en-US" dirty="0"/>
-              <a:t>Reminding you of places you still have data stored</a:t>
+              <a:t>Radioactive Decay/physical phenomenon vs seeding</a:t>
+            </a:r>
+          </a:p>
+          <a:p>
+            <a:r>
+              <a:rPr lang="en-US" dirty="0"/>
+              <a:t>Hardware mixed with algorithmic solutions</a:t>
             </a:r>
           </a:p>
           <a:p>
@@ -3908,7 +3921,7 @@
           <a:p>
             <a:r>
               <a:rPr lang="en-US" dirty="0"/>
-              <a:t>Passwords are not the end-all-be-all</a:t>
+              <a:t>But in the end, passwords are not the end-all-be-all</a:t>
             </a:r>
           </a:p>
         </p:txBody>

</xml_diff>